<commit_message>
[ADD] SELECT study - GROUP BY and HAVING
</commit_message>
<xml_diff>
--- a/Practice/db-practice_05.pptx
+++ b/Practice/db-practice_05.pptx
@@ -14,6 +14,8 @@
     <p:sldId id="262" r:id="rId8"/>
     <p:sldId id="263" r:id="rId9"/>
     <p:sldId id="264" r:id="rId10"/>
+    <p:sldId id="265" r:id="rId11"/>
+    <p:sldId id="266" r:id="rId12"/>
   </p:sldIdLst>
   <p:sldSz cx="12192000" cy="6858000"/>
   <p:notesSz cx="6858000" cy="9144000"/>
@@ -3377,6 +3379,138 @@
 </p:sld>
 </file>
 
+<file path=ppt/slides/slide10.xml><?xml version="1.0" encoding="utf-8"?>
+<p:sld xmlns:a="http://schemas.openxmlformats.org/drawingml/2006/main" xmlns:r="http://schemas.openxmlformats.org/officeDocument/2006/relationships" xmlns:p="http://schemas.openxmlformats.org/presentationml/2006/main">
+  <p:cSld>
+    <p:spTree>
+      <p:nvGrpSpPr>
+        <p:cNvPr id="1" name="">
+          <a:extLst>
+            <a:ext uri="{FF2B5EF4-FFF2-40B4-BE49-F238E27FC236}">
+              <a16:creationId xmlns:a16="http://schemas.microsoft.com/office/drawing/2014/main" id="{E57D0870-139B-BD86-C6E4-97355AB74087}"/>
+            </a:ext>
+          </a:extLst>
+        </p:cNvPr>
+        <p:cNvGrpSpPr/>
+        <p:nvPr/>
+      </p:nvGrpSpPr>
+      <p:grpSpPr>
+        <a:xfrm>
+          <a:off x="0" y="0"/>
+          <a:ext cx="0" cy="0"/>
+          <a:chOff x="0" y="0"/>
+          <a:chExt cx="0" cy="0"/>
+        </a:xfrm>
+      </p:grpSpPr>
+      <p:pic>
+        <p:nvPicPr>
+          <p:cNvPr id="3" name="그림 2">
+            <a:extLst>
+              <a:ext uri="{FF2B5EF4-FFF2-40B4-BE49-F238E27FC236}">
+                <a16:creationId xmlns:a16="http://schemas.microsoft.com/office/drawing/2014/main" id="{856C6170-0D1B-D453-F45E-DEBD80E90998}"/>
+              </a:ext>
+            </a:extLst>
+          </p:cNvPr>
+          <p:cNvPicPr>
+            <a:picLocks noChangeAspect="1"/>
+          </p:cNvPicPr>
+          <p:nvPr/>
+        </p:nvPicPr>
+        <p:blipFill>
+          <a:blip r:embed="rId2"/>
+          <a:stretch>
+            <a:fillRect/>
+          </a:stretch>
+        </p:blipFill>
+        <p:spPr>
+          <a:xfrm>
+            <a:off x="0" y="0"/>
+            <a:ext cx="12192000" cy="6858000"/>
+          </a:xfrm>
+          <a:prstGeom prst="rect">
+            <a:avLst/>
+          </a:prstGeom>
+        </p:spPr>
+      </p:pic>
+    </p:spTree>
+    <p:extLst>
+      <p:ext uri="{BB962C8B-B14F-4D97-AF65-F5344CB8AC3E}">
+        <p14:creationId xmlns:p14="http://schemas.microsoft.com/office/powerpoint/2010/main" val="1127434635"/>
+      </p:ext>
+    </p:extLst>
+  </p:cSld>
+  <p:clrMapOvr>
+    <a:masterClrMapping/>
+  </p:clrMapOvr>
+</p:sld>
+</file>
+
+<file path=ppt/slides/slide11.xml><?xml version="1.0" encoding="utf-8"?>
+<p:sld xmlns:a="http://schemas.openxmlformats.org/drawingml/2006/main" xmlns:r="http://schemas.openxmlformats.org/officeDocument/2006/relationships" xmlns:p="http://schemas.openxmlformats.org/presentationml/2006/main">
+  <p:cSld>
+    <p:spTree>
+      <p:nvGrpSpPr>
+        <p:cNvPr id="1" name="">
+          <a:extLst>
+            <a:ext uri="{FF2B5EF4-FFF2-40B4-BE49-F238E27FC236}">
+              <a16:creationId xmlns:a16="http://schemas.microsoft.com/office/drawing/2014/main" id="{78700962-D87C-4A75-73C9-A4DBA39A45C6}"/>
+            </a:ext>
+          </a:extLst>
+        </p:cNvPr>
+        <p:cNvGrpSpPr/>
+        <p:nvPr/>
+      </p:nvGrpSpPr>
+      <p:grpSpPr>
+        <a:xfrm>
+          <a:off x="0" y="0"/>
+          <a:ext cx="0" cy="0"/>
+          <a:chOff x="0" y="0"/>
+          <a:chExt cx="0" cy="0"/>
+        </a:xfrm>
+      </p:grpSpPr>
+      <p:pic>
+        <p:nvPicPr>
+          <p:cNvPr id="3" name="그림 2">
+            <a:extLst>
+              <a:ext uri="{FF2B5EF4-FFF2-40B4-BE49-F238E27FC236}">
+                <a16:creationId xmlns:a16="http://schemas.microsoft.com/office/drawing/2014/main" id="{6E7C8D21-337B-8DF2-C840-E415D637867C}"/>
+              </a:ext>
+            </a:extLst>
+          </p:cNvPr>
+          <p:cNvPicPr>
+            <a:picLocks noChangeAspect="1"/>
+          </p:cNvPicPr>
+          <p:nvPr/>
+        </p:nvPicPr>
+        <p:blipFill>
+          <a:blip r:embed="rId2"/>
+          <a:stretch>
+            <a:fillRect/>
+          </a:stretch>
+        </p:blipFill>
+        <p:spPr>
+          <a:xfrm>
+            <a:off x="0" y="0"/>
+            <a:ext cx="12192000" cy="6858000"/>
+          </a:xfrm>
+          <a:prstGeom prst="rect">
+            <a:avLst/>
+          </a:prstGeom>
+        </p:spPr>
+      </p:pic>
+    </p:spTree>
+    <p:extLst>
+      <p:ext uri="{BB962C8B-B14F-4D97-AF65-F5344CB8AC3E}">
+        <p14:creationId xmlns:p14="http://schemas.microsoft.com/office/powerpoint/2010/main" val="3688297293"/>
+      </p:ext>
+    </p:extLst>
+  </p:cSld>
+  <p:clrMapOvr>
+    <a:masterClrMapping/>
+  </p:clrMapOvr>
+</p:sld>
+</file>
+
 <file path=ppt/slides/slide2.xml><?xml version="1.0" encoding="utf-8"?>
 <p:sld xmlns:a="http://schemas.openxmlformats.org/drawingml/2006/main" xmlns:r="http://schemas.openxmlformats.org/officeDocument/2006/relationships" xmlns:p="http://schemas.openxmlformats.org/presentationml/2006/main">
   <p:cSld>
@@ -3864,10 +3998,10 @@
       </p:grpSpPr>
       <p:pic>
         <p:nvPicPr>
-          <p:cNvPr id="4" name="그림 3">
-            <a:extLst>
-              <a:ext uri="{FF2B5EF4-FFF2-40B4-BE49-F238E27FC236}">
-                <a16:creationId xmlns:a16="http://schemas.microsoft.com/office/drawing/2014/main" id="{580222E3-73DC-DCBB-13D7-344875CA8D5F}"/>
+          <p:cNvPr id="6" name="그림 5">
+            <a:extLst>
+              <a:ext uri="{FF2B5EF4-FFF2-40B4-BE49-F238E27FC236}">
+                <a16:creationId xmlns:a16="http://schemas.microsoft.com/office/drawing/2014/main" id="{C79C4853-ADEB-BF75-C701-5B6FE7D4F4DE}"/>
               </a:ext>
             </a:extLst>
           </p:cNvPr>
@@ -3884,8 +4018,8 @@
         </p:blipFill>
         <p:spPr>
           <a:xfrm>
-            <a:off x="0" y="10599"/>
-            <a:ext cx="12192000" cy="6836802"/>
+            <a:off x="0" y="0"/>
+            <a:ext cx="12192000" cy="6858000"/>
           </a:xfrm>
           <a:prstGeom prst="rect">
             <a:avLst/>

</xml_diff>

<commit_message>
[ADD] Studying Update and Delete
</commit_message>
<xml_diff>
--- a/Practice/db-practice_05.pptx
+++ b/Practice/db-practice_05.pptx
@@ -16,6 +16,7 @@
     <p:sldId id="264" r:id="rId10"/>
     <p:sldId id="265" r:id="rId11"/>
     <p:sldId id="266" r:id="rId12"/>
+    <p:sldId id="267" r:id="rId13"/>
   </p:sldIdLst>
   <p:sldSz cx="12192000" cy="6858000"/>
   <p:notesSz cx="6858000" cy="9144000"/>
@@ -269,7 +270,7 @@
           <a:p>
             <a:fld id="{9E8C257C-B0BF-4458-BCB4-AD4358D12A42}" type="datetimeFigureOut">
               <a:rPr lang="ko-KR" altLang="en-US" smtClean="0"/>
-              <a:t>2025-03-31</a:t>
+              <a:t>2025-04-01</a:t>
             </a:fld>
             <a:endParaRPr lang="ko-KR" altLang="en-US"/>
           </a:p>
@@ -467,7 +468,7 @@
           <a:p>
             <a:fld id="{9E8C257C-B0BF-4458-BCB4-AD4358D12A42}" type="datetimeFigureOut">
               <a:rPr lang="ko-KR" altLang="en-US" smtClean="0"/>
-              <a:t>2025-03-31</a:t>
+              <a:t>2025-04-01</a:t>
             </a:fld>
             <a:endParaRPr lang="ko-KR" altLang="en-US"/>
           </a:p>
@@ -675,7 +676,7 @@
           <a:p>
             <a:fld id="{9E8C257C-B0BF-4458-BCB4-AD4358D12A42}" type="datetimeFigureOut">
               <a:rPr lang="ko-KR" altLang="en-US" smtClean="0"/>
-              <a:t>2025-03-31</a:t>
+              <a:t>2025-04-01</a:t>
             </a:fld>
             <a:endParaRPr lang="ko-KR" altLang="en-US"/>
           </a:p>
@@ -873,7 +874,7 @@
           <a:p>
             <a:fld id="{9E8C257C-B0BF-4458-BCB4-AD4358D12A42}" type="datetimeFigureOut">
               <a:rPr lang="ko-KR" altLang="en-US" smtClean="0"/>
-              <a:t>2025-03-31</a:t>
+              <a:t>2025-04-01</a:t>
             </a:fld>
             <a:endParaRPr lang="ko-KR" altLang="en-US"/>
           </a:p>
@@ -1148,7 +1149,7 @@
           <a:p>
             <a:fld id="{9E8C257C-B0BF-4458-BCB4-AD4358D12A42}" type="datetimeFigureOut">
               <a:rPr lang="ko-KR" altLang="en-US" smtClean="0"/>
-              <a:t>2025-03-31</a:t>
+              <a:t>2025-04-01</a:t>
             </a:fld>
             <a:endParaRPr lang="ko-KR" altLang="en-US"/>
           </a:p>
@@ -1413,7 +1414,7 @@
           <a:p>
             <a:fld id="{9E8C257C-B0BF-4458-BCB4-AD4358D12A42}" type="datetimeFigureOut">
               <a:rPr lang="ko-KR" altLang="en-US" smtClean="0"/>
-              <a:t>2025-03-31</a:t>
+              <a:t>2025-04-01</a:t>
             </a:fld>
             <a:endParaRPr lang="ko-KR" altLang="en-US"/>
           </a:p>
@@ -1825,7 +1826,7 @@
           <a:p>
             <a:fld id="{9E8C257C-B0BF-4458-BCB4-AD4358D12A42}" type="datetimeFigureOut">
               <a:rPr lang="ko-KR" altLang="en-US" smtClean="0"/>
-              <a:t>2025-03-31</a:t>
+              <a:t>2025-04-01</a:t>
             </a:fld>
             <a:endParaRPr lang="ko-KR" altLang="en-US"/>
           </a:p>
@@ -1966,7 +1967,7 @@
           <a:p>
             <a:fld id="{9E8C257C-B0BF-4458-BCB4-AD4358D12A42}" type="datetimeFigureOut">
               <a:rPr lang="ko-KR" altLang="en-US" smtClean="0"/>
-              <a:t>2025-03-31</a:t>
+              <a:t>2025-04-01</a:t>
             </a:fld>
             <a:endParaRPr lang="ko-KR" altLang="en-US"/>
           </a:p>
@@ -2079,7 +2080,7 @@
           <a:p>
             <a:fld id="{9E8C257C-B0BF-4458-BCB4-AD4358D12A42}" type="datetimeFigureOut">
               <a:rPr lang="ko-KR" altLang="en-US" smtClean="0"/>
-              <a:t>2025-03-31</a:t>
+              <a:t>2025-04-01</a:t>
             </a:fld>
             <a:endParaRPr lang="ko-KR" altLang="en-US"/>
           </a:p>
@@ -2390,7 +2391,7 @@
           <a:p>
             <a:fld id="{9E8C257C-B0BF-4458-BCB4-AD4358D12A42}" type="datetimeFigureOut">
               <a:rPr lang="ko-KR" altLang="en-US" smtClean="0"/>
-              <a:t>2025-03-31</a:t>
+              <a:t>2025-04-01</a:t>
             </a:fld>
             <a:endParaRPr lang="ko-KR" altLang="en-US"/>
           </a:p>
@@ -2678,7 +2679,7 @@
           <a:p>
             <a:fld id="{9E8C257C-B0BF-4458-BCB4-AD4358D12A42}" type="datetimeFigureOut">
               <a:rPr lang="ko-KR" altLang="en-US" smtClean="0"/>
-              <a:t>2025-03-31</a:t>
+              <a:t>2025-04-01</a:t>
             </a:fld>
             <a:endParaRPr lang="ko-KR" altLang="en-US"/>
           </a:p>
@@ -2919,7 +2920,7 @@
           <a:p>
             <a:fld id="{9E8C257C-B0BF-4458-BCB4-AD4358D12A42}" type="datetimeFigureOut">
               <a:rPr lang="ko-KR" altLang="en-US" smtClean="0"/>
-              <a:t>2025-03-31</a:t>
+              <a:t>2025-04-01</a:t>
             </a:fld>
             <a:endParaRPr lang="ko-KR" altLang="en-US"/>
           </a:p>
@@ -3502,6 +3503,72 @@
     <p:extLst>
       <p:ext uri="{BB962C8B-B14F-4D97-AF65-F5344CB8AC3E}">
         <p14:creationId xmlns:p14="http://schemas.microsoft.com/office/powerpoint/2010/main" val="3688297293"/>
+      </p:ext>
+    </p:extLst>
+  </p:cSld>
+  <p:clrMapOvr>
+    <a:masterClrMapping/>
+  </p:clrMapOvr>
+</p:sld>
+</file>
+
+<file path=ppt/slides/slide12.xml><?xml version="1.0" encoding="utf-8"?>
+<p:sld xmlns:a="http://schemas.openxmlformats.org/drawingml/2006/main" xmlns:r="http://schemas.openxmlformats.org/officeDocument/2006/relationships" xmlns:p="http://schemas.openxmlformats.org/presentationml/2006/main">
+  <p:cSld>
+    <p:spTree>
+      <p:nvGrpSpPr>
+        <p:cNvPr id="1" name="">
+          <a:extLst>
+            <a:ext uri="{FF2B5EF4-FFF2-40B4-BE49-F238E27FC236}">
+              <a16:creationId xmlns:a16="http://schemas.microsoft.com/office/drawing/2014/main" id="{C283789A-3A27-DC7E-B5C7-A967FE6E24D5}"/>
+            </a:ext>
+          </a:extLst>
+        </p:cNvPr>
+        <p:cNvGrpSpPr/>
+        <p:nvPr/>
+      </p:nvGrpSpPr>
+      <p:grpSpPr>
+        <a:xfrm>
+          <a:off x="0" y="0"/>
+          <a:ext cx="0" cy="0"/>
+          <a:chOff x="0" y="0"/>
+          <a:chExt cx="0" cy="0"/>
+        </a:xfrm>
+      </p:grpSpPr>
+      <p:pic>
+        <p:nvPicPr>
+          <p:cNvPr id="5" name="그림 4">
+            <a:extLst>
+              <a:ext uri="{FF2B5EF4-FFF2-40B4-BE49-F238E27FC236}">
+                <a16:creationId xmlns:a16="http://schemas.microsoft.com/office/drawing/2014/main" id="{603231A0-911D-6B16-0C0F-93596884323C}"/>
+              </a:ext>
+            </a:extLst>
+          </p:cNvPr>
+          <p:cNvPicPr>
+            <a:picLocks noChangeAspect="1"/>
+          </p:cNvPicPr>
+          <p:nvPr/>
+        </p:nvPicPr>
+        <p:blipFill>
+          <a:blip r:embed="rId2"/>
+          <a:stretch>
+            <a:fillRect/>
+          </a:stretch>
+        </p:blipFill>
+        <p:spPr>
+          <a:xfrm>
+            <a:off x="0" y="8926"/>
+            <a:ext cx="12192000" cy="6840148"/>
+          </a:xfrm>
+          <a:prstGeom prst="rect">
+            <a:avLst/>
+          </a:prstGeom>
+        </p:spPr>
+      </p:pic>
+    </p:spTree>
+    <p:extLst>
+      <p:ext uri="{BB962C8B-B14F-4D97-AF65-F5344CB8AC3E}">
+        <p14:creationId xmlns:p14="http://schemas.microsoft.com/office/powerpoint/2010/main" val="2751458890"/>
       </p:ext>
     </p:extLst>
   </p:cSld>

</xml_diff>